<commit_message>
Integrated delivery_v2 to main app
Created delivery version 2 and integrated delivery info into main app.
</commit_message>
<xml_diff>
--- a/022_91893+_+91897+Documentation.pptx
+++ b/022_91893+_+91897+Documentation.pptx
@@ -5,7 +5,7 @@
     <p:sldMasterId id="2147483659" r:id="rId1"/>
   </p:sldMasterIdLst>
   <p:notesMasterIdLst>
-    <p:notesMasterId r:id="rId27"/>
+    <p:notesMasterId r:id="rId31"/>
   </p:notesMasterIdLst>
   <p:sldIdLst>
     <p:sldId id="256" r:id="rId2"/>
@@ -31,8 +31,12 @@
     <p:sldId id="280" r:id="rId22"/>
     <p:sldId id="281" r:id="rId23"/>
     <p:sldId id="282" r:id="rId24"/>
-    <p:sldId id="261" r:id="rId25"/>
-    <p:sldId id="262" r:id="rId26"/>
+    <p:sldId id="283" r:id="rId25"/>
+    <p:sldId id="284" r:id="rId26"/>
+    <p:sldId id="285" r:id="rId27"/>
+    <p:sldId id="286" r:id="rId28"/>
+    <p:sldId id="261" r:id="rId29"/>
+    <p:sldId id="262" r:id="rId30"/>
   </p:sldIdLst>
   <p:sldSz cx="9144000" cy="5143500" type="screen16x9"/>
   <p:notesSz cx="6858000" cy="9144000"/>
@@ -297,7 +301,7 @@
   <pc:docChgLst>
     <pc:chgData name="Danett Pepito" userId="ddef1e2176689e9a" providerId="LiveId" clId="{53BB49C2-00DF-4AB6-9D9D-351DBF063D16}"/>
     <pc:docChg chg="undo custSel addSld delSld modSld sldOrd">
-      <pc:chgData name="Danett Pepito" userId="ddef1e2176689e9a" providerId="LiveId" clId="{53BB49C2-00DF-4AB6-9D9D-351DBF063D16}" dt="2022-02-28T21:56:11.393" v="1346" actId="20577"/>
+      <pc:chgData name="Danett Pepito" userId="ddef1e2176689e9a" providerId="LiveId" clId="{53BB49C2-00DF-4AB6-9D9D-351DBF063D16}" dt="2022-03-01T20:33:48.422" v="1407" actId="1076"/>
       <pc:docMkLst>
         <pc:docMk/>
       </pc:docMkLst>
@@ -1235,6 +1239,146 @@
           </ac:picMkLst>
         </pc:picChg>
       </pc:sldChg>
+      <pc:sldChg chg="addSp delSp modSp add mod">
+        <pc:chgData name="Danett Pepito" userId="ddef1e2176689e9a" providerId="LiveId" clId="{53BB49C2-00DF-4AB6-9D9D-351DBF063D16}" dt="2022-03-01T20:11:14.747" v="1364" actId="1076"/>
+        <pc:sldMkLst>
+          <pc:docMk/>
+          <pc:sldMk cId="872163139" sldId="283"/>
+        </pc:sldMkLst>
+        <pc:spChg chg="mod">
+          <ac:chgData name="Danett Pepito" userId="ddef1e2176689e9a" providerId="LiveId" clId="{53BB49C2-00DF-4AB6-9D9D-351DBF063D16}" dt="2022-03-01T20:10:26.175" v="1356" actId="20577"/>
+          <ac:spMkLst>
+            <pc:docMk/>
+            <pc:sldMk cId="872163139" sldId="283"/>
+            <ac:spMk id="73" creationId="{00000000-0000-0000-0000-000000000000}"/>
+          </ac:spMkLst>
+        </pc:spChg>
+        <pc:picChg chg="add mod">
+          <ac:chgData name="Danett Pepito" userId="ddef1e2176689e9a" providerId="LiveId" clId="{53BB49C2-00DF-4AB6-9D9D-351DBF063D16}" dt="2022-03-01T20:11:14.747" v="1364" actId="1076"/>
+          <ac:picMkLst>
+            <pc:docMk/>
+            <pc:sldMk cId="872163139" sldId="283"/>
+            <ac:picMk id="3" creationId="{68F19E0E-F021-4DF4-944A-26E005F119F0}"/>
+          </ac:picMkLst>
+        </pc:picChg>
+        <pc:picChg chg="del">
+          <ac:chgData name="Danett Pepito" userId="ddef1e2176689e9a" providerId="LiveId" clId="{53BB49C2-00DF-4AB6-9D9D-351DBF063D16}" dt="2022-03-01T20:11:09.305" v="1361" actId="478"/>
+          <ac:picMkLst>
+            <pc:docMk/>
+            <pc:sldMk cId="872163139" sldId="283"/>
+            <ac:picMk id="4" creationId="{994B848F-63E8-4428-B2FD-CDB9DE1FDDA9}"/>
+          </ac:picMkLst>
+        </pc:picChg>
+      </pc:sldChg>
+      <pc:sldChg chg="addSp delSp modSp add mod replId">
+        <pc:chgData name="Danett Pepito" userId="ddef1e2176689e9a" providerId="LiveId" clId="{53BB49C2-00DF-4AB6-9D9D-351DBF063D16}" dt="2022-03-01T20:21:07.754" v="1395" actId="20577"/>
+        <pc:sldMkLst>
+          <pc:docMk/>
+          <pc:sldMk cId="425023443" sldId="284"/>
+        </pc:sldMkLst>
+        <pc:spChg chg="mod">
+          <ac:chgData name="Danett Pepito" userId="ddef1e2176689e9a" providerId="LiveId" clId="{53BB49C2-00DF-4AB6-9D9D-351DBF063D16}" dt="2022-03-01T20:10:30.603" v="1358" actId="20577"/>
+          <ac:spMkLst>
+            <pc:docMk/>
+            <pc:sldMk cId="425023443" sldId="284"/>
+            <ac:spMk id="78" creationId="{00000000-0000-0000-0000-000000000000}"/>
+          </ac:spMkLst>
+        </pc:spChg>
+        <pc:graphicFrameChg chg="modGraphic">
+          <ac:chgData name="Danett Pepito" userId="ddef1e2176689e9a" providerId="LiveId" clId="{53BB49C2-00DF-4AB6-9D9D-351DBF063D16}" dt="2022-03-01T20:21:07.754" v="1395" actId="20577"/>
+          <ac:graphicFrameMkLst>
+            <pc:docMk/>
+            <pc:sldMk cId="425023443" sldId="284"/>
+            <ac:graphicFrameMk id="79" creationId="{00000000-0000-0000-0000-000000000000}"/>
+          </ac:graphicFrameMkLst>
+        </pc:graphicFrameChg>
+        <pc:picChg chg="del">
+          <ac:chgData name="Danett Pepito" userId="ddef1e2176689e9a" providerId="LiveId" clId="{53BB49C2-00DF-4AB6-9D9D-351DBF063D16}" dt="2022-03-01T20:10:38.486" v="1359" actId="478"/>
+          <ac:picMkLst>
+            <pc:docMk/>
+            <pc:sldMk cId="425023443" sldId="284"/>
+            <ac:picMk id="3" creationId="{3DB47A2F-33DD-4DC4-9B2E-79D2DBD68C4A}"/>
+          </ac:picMkLst>
+        </pc:picChg>
+        <pc:picChg chg="add mod">
+          <ac:chgData name="Danett Pepito" userId="ddef1e2176689e9a" providerId="LiveId" clId="{53BB49C2-00DF-4AB6-9D9D-351DBF063D16}" dt="2022-03-01T20:19:57.759" v="1371" actId="1076"/>
+          <ac:picMkLst>
+            <pc:docMk/>
+            <pc:sldMk cId="425023443" sldId="284"/>
+            <ac:picMk id="4" creationId="{A63FC167-7201-4185-AD0D-A1A5C0118B50}"/>
+          </ac:picMkLst>
+        </pc:picChg>
+        <pc:picChg chg="del">
+          <ac:chgData name="Danett Pepito" userId="ddef1e2176689e9a" providerId="LiveId" clId="{53BB49C2-00DF-4AB6-9D9D-351DBF063D16}" dt="2022-03-01T20:10:39.351" v="1360" actId="478"/>
+          <ac:picMkLst>
+            <pc:docMk/>
+            <pc:sldMk cId="425023443" sldId="284"/>
+            <ac:picMk id="5" creationId="{A20F300F-D754-409F-B71A-A41DC2146712}"/>
+          </ac:picMkLst>
+        </pc:picChg>
+        <pc:picChg chg="add mod">
+          <ac:chgData name="Danett Pepito" userId="ddef1e2176689e9a" providerId="LiveId" clId="{53BB49C2-00DF-4AB6-9D9D-351DBF063D16}" dt="2022-03-01T20:20:14.116" v="1373" actId="1076"/>
+          <ac:picMkLst>
+            <pc:docMk/>
+            <pc:sldMk cId="425023443" sldId="284"/>
+            <ac:picMk id="7" creationId="{E6EE6A81-9169-451B-B19E-1EEC663162DB}"/>
+          </ac:picMkLst>
+        </pc:picChg>
+      </pc:sldChg>
+      <pc:sldChg chg="delSp add mod">
+        <pc:chgData name="Danett Pepito" userId="ddef1e2176689e9a" providerId="LiveId" clId="{53BB49C2-00DF-4AB6-9D9D-351DBF063D16}" dt="2022-03-01T20:32:33.252" v="1397" actId="478"/>
+        <pc:sldMkLst>
+          <pc:docMk/>
+          <pc:sldMk cId="597073633" sldId="285"/>
+        </pc:sldMkLst>
+        <pc:picChg chg="del">
+          <ac:chgData name="Danett Pepito" userId="ddef1e2176689e9a" providerId="LiveId" clId="{53BB49C2-00DF-4AB6-9D9D-351DBF063D16}" dt="2022-03-01T20:32:33.252" v="1397" actId="478"/>
+          <ac:picMkLst>
+            <pc:docMk/>
+            <pc:sldMk cId="597073633" sldId="285"/>
+            <ac:picMk id="3" creationId="{68F19E0E-F021-4DF4-944A-26E005F119F0}"/>
+          </ac:picMkLst>
+        </pc:picChg>
+      </pc:sldChg>
+      <pc:sldChg chg="addSp delSp modSp add mod replId">
+        <pc:chgData name="Danett Pepito" userId="ddef1e2176689e9a" providerId="LiveId" clId="{53BB49C2-00DF-4AB6-9D9D-351DBF063D16}" dt="2022-03-01T20:33:48.422" v="1407" actId="1076"/>
+        <pc:sldMkLst>
+          <pc:docMk/>
+          <pc:sldMk cId="1149234813" sldId="286"/>
+        </pc:sldMkLst>
+        <pc:picChg chg="add mod">
+          <ac:chgData name="Danett Pepito" userId="ddef1e2176689e9a" providerId="LiveId" clId="{53BB49C2-00DF-4AB6-9D9D-351DBF063D16}" dt="2022-03-01T20:32:41.824" v="1403" actId="1076"/>
+          <ac:picMkLst>
+            <pc:docMk/>
+            <pc:sldMk cId="1149234813" sldId="286"/>
+            <ac:picMk id="3" creationId="{D088232B-DFBC-435E-858F-CB6FBD7CAD6F}"/>
+          </ac:picMkLst>
+        </pc:picChg>
+        <pc:picChg chg="del">
+          <ac:chgData name="Danett Pepito" userId="ddef1e2176689e9a" providerId="LiveId" clId="{53BB49C2-00DF-4AB6-9D9D-351DBF063D16}" dt="2022-03-01T20:33:44.402" v="1404" actId="478"/>
+          <ac:picMkLst>
+            <pc:docMk/>
+            <pc:sldMk cId="1149234813" sldId="286"/>
+            <ac:picMk id="4" creationId="{A63FC167-7201-4185-AD0D-A1A5C0118B50}"/>
+          </ac:picMkLst>
+        </pc:picChg>
+        <pc:picChg chg="add mod">
+          <ac:chgData name="Danett Pepito" userId="ddef1e2176689e9a" providerId="LiveId" clId="{53BB49C2-00DF-4AB6-9D9D-351DBF063D16}" dt="2022-03-01T20:33:48.422" v="1407" actId="1076"/>
+          <ac:picMkLst>
+            <pc:docMk/>
+            <pc:sldMk cId="1149234813" sldId="286"/>
+            <ac:picMk id="6" creationId="{38648B43-C8D9-46A0-8904-CD24F850A19C}"/>
+          </ac:picMkLst>
+        </pc:picChg>
+        <pc:picChg chg="del">
+          <ac:chgData name="Danett Pepito" userId="ddef1e2176689e9a" providerId="LiveId" clId="{53BB49C2-00DF-4AB6-9D9D-351DBF063D16}" dt="2022-03-01T20:32:35.127" v="1398" actId="478"/>
+          <ac:picMkLst>
+            <pc:docMk/>
+            <pc:sldMk cId="1149234813" sldId="286"/>
+            <ac:picMk id="7" creationId="{E6EE6A81-9169-451B-B19E-1EEC663162DB}"/>
+          </ac:picMkLst>
+        </pc:picChg>
+      </pc:sldChg>
     </pc:docChg>
   </pc:docChgLst>
   <pc:docChgLst>
@@ -3463,6 +3607,442 @@
   <p:cSld>
     <p:spTree>
       <p:nvGrpSpPr>
+        <p:cNvPr id="1" name="Shape 69"/>
+        <p:cNvGrpSpPr/>
+        <p:nvPr/>
+      </p:nvGrpSpPr>
+      <p:grpSpPr>
+        <a:xfrm>
+          <a:off x="0" y="0"/>
+          <a:ext cx="0" cy="0"/>
+          <a:chOff x="0" y="0"/>
+          <a:chExt cx="0" cy="0"/>
+        </a:xfrm>
+      </p:grpSpPr>
+      <p:sp>
+        <p:nvSpPr>
+          <p:cNvPr id="70" name="Google Shape;70;gac10fef634_0_16:notes"/>
+          <p:cNvSpPr>
+            <a:spLocks noGrp="1" noRot="1" noChangeAspect="1"/>
+          </p:cNvSpPr>
+          <p:nvPr>
+            <p:ph type="sldImg" idx="2"/>
+          </p:nvPr>
+        </p:nvSpPr>
+        <p:spPr>
+          <a:xfrm>
+            <a:off x="381000" y="685800"/>
+            <a:ext cx="6096000" cy="3429000"/>
+          </a:xfrm>
+          <a:custGeom>
+            <a:avLst/>
+            <a:gdLst/>
+            <a:ahLst/>
+            <a:cxnLst/>
+            <a:rect l="l" t="t" r="r" b="b"/>
+            <a:pathLst>
+              <a:path w="120000" h="120000" extrusionOk="0">
+                <a:moveTo>
+                  <a:pt x="0" y="0"/>
+                </a:moveTo>
+                <a:lnTo>
+                  <a:pt x="120000" y="0"/>
+                </a:lnTo>
+                <a:lnTo>
+                  <a:pt x="120000" y="120000"/>
+                </a:lnTo>
+                <a:lnTo>
+                  <a:pt x="0" y="120000"/>
+                </a:lnTo>
+                <a:close/>
+              </a:path>
+            </a:pathLst>
+          </a:custGeom>
+        </p:spPr>
+      </p:sp>
+      <p:sp>
+        <p:nvSpPr>
+          <p:cNvPr id="71" name="Google Shape;71;gac10fef634_0_16:notes"/>
+          <p:cNvSpPr txBox="1">
+            <a:spLocks noGrp="1"/>
+          </p:cNvSpPr>
+          <p:nvPr>
+            <p:ph type="body" idx="1"/>
+          </p:nvPr>
+        </p:nvSpPr>
+        <p:spPr>
+          <a:xfrm>
+            <a:off x="685800" y="4343400"/>
+            <a:ext cx="5486400" cy="4114800"/>
+          </a:xfrm>
+          <a:prstGeom prst="rect">
+            <a:avLst/>
+          </a:prstGeom>
+        </p:spPr>
+        <p:txBody>
+          <a:bodyPr spcFirstLastPara="1" wrap="square" lIns="91425" tIns="91425" rIns="91425" bIns="91425" anchor="t" anchorCtr="0">
+            <a:noAutofit/>
+          </a:bodyPr>
+          <a:lstStyle/>
+          <a:p>
+            <a:pPr marL="0" lvl="0" indent="0" algn="l" rtl="0">
+              <a:spcBef>
+                <a:spcPts val="0"/>
+              </a:spcBef>
+              <a:spcAft>
+                <a:spcPts val="0"/>
+              </a:spcAft>
+              <a:buNone/>
+            </a:pPr>
+            <a:endParaRPr/>
+          </a:p>
+        </p:txBody>
+      </p:sp>
+    </p:spTree>
+    <p:extLst>
+      <p:ext uri="{BB962C8B-B14F-4D97-AF65-F5344CB8AC3E}">
+        <p14:creationId xmlns:p14="http://schemas.microsoft.com/office/powerpoint/2010/main" val="4183629312"/>
+      </p:ext>
+    </p:extLst>
+  </p:cSld>
+  <p:clrMapOvr>
+    <a:masterClrMapping/>
+  </p:clrMapOvr>
+</p:notes>
+</file>
+
+<file path=ppt/notesSlides/notesSlide25.xml><?xml version="1.0" encoding="utf-8"?>
+<p:notes xmlns:a="http://schemas.openxmlformats.org/drawingml/2006/main" xmlns:r="http://schemas.openxmlformats.org/officeDocument/2006/relationships" xmlns:p="http://schemas.openxmlformats.org/presentationml/2006/main" showMasterSp="0" showMasterPhAnim="0">
+  <p:cSld>
+    <p:spTree>
+      <p:nvGrpSpPr>
+        <p:cNvPr id="1" name="Shape 74"/>
+        <p:cNvGrpSpPr/>
+        <p:nvPr/>
+      </p:nvGrpSpPr>
+      <p:grpSpPr>
+        <a:xfrm>
+          <a:off x="0" y="0"/>
+          <a:ext cx="0" cy="0"/>
+          <a:chOff x="0" y="0"/>
+          <a:chExt cx="0" cy="0"/>
+        </a:xfrm>
+      </p:grpSpPr>
+      <p:sp>
+        <p:nvSpPr>
+          <p:cNvPr id="75" name="Google Shape;75;gac10fef634_0_20:notes"/>
+          <p:cNvSpPr>
+            <a:spLocks noGrp="1" noRot="1" noChangeAspect="1"/>
+          </p:cNvSpPr>
+          <p:nvPr>
+            <p:ph type="sldImg" idx="2"/>
+          </p:nvPr>
+        </p:nvSpPr>
+        <p:spPr>
+          <a:xfrm>
+            <a:off x="381000" y="685800"/>
+            <a:ext cx="6096000" cy="3429000"/>
+          </a:xfrm>
+          <a:custGeom>
+            <a:avLst/>
+            <a:gdLst/>
+            <a:ahLst/>
+            <a:cxnLst/>
+            <a:rect l="l" t="t" r="r" b="b"/>
+            <a:pathLst>
+              <a:path w="120000" h="120000" extrusionOk="0">
+                <a:moveTo>
+                  <a:pt x="0" y="0"/>
+                </a:moveTo>
+                <a:lnTo>
+                  <a:pt x="120000" y="0"/>
+                </a:lnTo>
+                <a:lnTo>
+                  <a:pt x="120000" y="120000"/>
+                </a:lnTo>
+                <a:lnTo>
+                  <a:pt x="0" y="120000"/>
+                </a:lnTo>
+                <a:close/>
+              </a:path>
+            </a:pathLst>
+          </a:custGeom>
+        </p:spPr>
+      </p:sp>
+      <p:sp>
+        <p:nvSpPr>
+          <p:cNvPr id="76" name="Google Shape;76;gac10fef634_0_20:notes"/>
+          <p:cNvSpPr txBox="1">
+            <a:spLocks noGrp="1"/>
+          </p:cNvSpPr>
+          <p:nvPr>
+            <p:ph type="body" idx="1"/>
+          </p:nvPr>
+        </p:nvSpPr>
+        <p:spPr>
+          <a:xfrm>
+            <a:off x="685800" y="4343400"/>
+            <a:ext cx="5486400" cy="4114800"/>
+          </a:xfrm>
+          <a:prstGeom prst="rect">
+            <a:avLst/>
+          </a:prstGeom>
+        </p:spPr>
+        <p:txBody>
+          <a:bodyPr spcFirstLastPara="1" wrap="square" lIns="91425" tIns="91425" rIns="91425" bIns="91425" anchor="t" anchorCtr="0">
+            <a:noAutofit/>
+          </a:bodyPr>
+          <a:lstStyle/>
+          <a:p>
+            <a:pPr marL="0" lvl="0" indent="0" algn="l" rtl="0">
+              <a:spcBef>
+                <a:spcPts val="0"/>
+              </a:spcBef>
+              <a:spcAft>
+                <a:spcPts val="0"/>
+              </a:spcAft>
+              <a:buNone/>
+            </a:pPr>
+            <a:endParaRPr/>
+          </a:p>
+        </p:txBody>
+      </p:sp>
+    </p:spTree>
+    <p:extLst>
+      <p:ext uri="{BB962C8B-B14F-4D97-AF65-F5344CB8AC3E}">
+        <p14:creationId xmlns:p14="http://schemas.microsoft.com/office/powerpoint/2010/main" val="1715034860"/>
+      </p:ext>
+    </p:extLst>
+  </p:cSld>
+  <p:clrMapOvr>
+    <a:masterClrMapping/>
+  </p:clrMapOvr>
+</p:notes>
+</file>
+
+<file path=ppt/notesSlides/notesSlide26.xml><?xml version="1.0" encoding="utf-8"?>
+<p:notes xmlns:a="http://schemas.openxmlformats.org/drawingml/2006/main" xmlns:r="http://schemas.openxmlformats.org/officeDocument/2006/relationships" xmlns:p="http://schemas.openxmlformats.org/presentationml/2006/main" showMasterSp="0" showMasterPhAnim="0">
+  <p:cSld>
+    <p:spTree>
+      <p:nvGrpSpPr>
+        <p:cNvPr id="1" name="Shape 69"/>
+        <p:cNvGrpSpPr/>
+        <p:nvPr/>
+      </p:nvGrpSpPr>
+      <p:grpSpPr>
+        <a:xfrm>
+          <a:off x="0" y="0"/>
+          <a:ext cx="0" cy="0"/>
+          <a:chOff x="0" y="0"/>
+          <a:chExt cx="0" cy="0"/>
+        </a:xfrm>
+      </p:grpSpPr>
+      <p:sp>
+        <p:nvSpPr>
+          <p:cNvPr id="70" name="Google Shape;70;gac10fef634_0_16:notes"/>
+          <p:cNvSpPr>
+            <a:spLocks noGrp="1" noRot="1" noChangeAspect="1"/>
+          </p:cNvSpPr>
+          <p:nvPr>
+            <p:ph type="sldImg" idx="2"/>
+          </p:nvPr>
+        </p:nvSpPr>
+        <p:spPr>
+          <a:xfrm>
+            <a:off x="381000" y="685800"/>
+            <a:ext cx="6096000" cy="3429000"/>
+          </a:xfrm>
+          <a:custGeom>
+            <a:avLst/>
+            <a:gdLst/>
+            <a:ahLst/>
+            <a:cxnLst/>
+            <a:rect l="l" t="t" r="r" b="b"/>
+            <a:pathLst>
+              <a:path w="120000" h="120000" extrusionOk="0">
+                <a:moveTo>
+                  <a:pt x="0" y="0"/>
+                </a:moveTo>
+                <a:lnTo>
+                  <a:pt x="120000" y="0"/>
+                </a:lnTo>
+                <a:lnTo>
+                  <a:pt x="120000" y="120000"/>
+                </a:lnTo>
+                <a:lnTo>
+                  <a:pt x="0" y="120000"/>
+                </a:lnTo>
+                <a:close/>
+              </a:path>
+            </a:pathLst>
+          </a:custGeom>
+        </p:spPr>
+      </p:sp>
+      <p:sp>
+        <p:nvSpPr>
+          <p:cNvPr id="71" name="Google Shape;71;gac10fef634_0_16:notes"/>
+          <p:cNvSpPr txBox="1">
+            <a:spLocks noGrp="1"/>
+          </p:cNvSpPr>
+          <p:nvPr>
+            <p:ph type="body" idx="1"/>
+          </p:nvPr>
+        </p:nvSpPr>
+        <p:spPr>
+          <a:xfrm>
+            <a:off x="685800" y="4343400"/>
+            <a:ext cx="5486400" cy="4114800"/>
+          </a:xfrm>
+          <a:prstGeom prst="rect">
+            <a:avLst/>
+          </a:prstGeom>
+        </p:spPr>
+        <p:txBody>
+          <a:bodyPr spcFirstLastPara="1" wrap="square" lIns="91425" tIns="91425" rIns="91425" bIns="91425" anchor="t" anchorCtr="0">
+            <a:noAutofit/>
+          </a:bodyPr>
+          <a:lstStyle/>
+          <a:p>
+            <a:pPr marL="0" lvl="0" indent="0" algn="l" rtl="0">
+              <a:spcBef>
+                <a:spcPts val="0"/>
+              </a:spcBef>
+              <a:spcAft>
+                <a:spcPts val="0"/>
+              </a:spcAft>
+              <a:buNone/>
+            </a:pPr>
+            <a:endParaRPr/>
+          </a:p>
+        </p:txBody>
+      </p:sp>
+    </p:spTree>
+    <p:extLst>
+      <p:ext uri="{BB962C8B-B14F-4D97-AF65-F5344CB8AC3E}">
+        <p14:creationId xmlns:p14="http://schemas.microsoft.com/office/powerpoint/2010/main" val="388463686"/>
+      </p:ext>
+    </p:extLst>
+  </p:cSld>
+  <p:clrMapOvr>
+    <a:masterClrMapping/>
+  </p:clrMapOvr>
+</p:notes>
+</file>
+
+<file path=ppt/notesSlides/notesSlide27.xml><?xml version="1.0" encoding="utf-8"?>
+<p:notes xmlns:a="http://schemas.openxmlformats.org/drawingml/2006/main" xmlns:r="http://schemas.openxmlformats.org/officeDocument/2006/relationships" xmlns:p="http://schemas.openxmlformats.org/presentationml/2006/main" showMasterSp="0" showMasterPhAnim="0">
+  <p:cSld>
+    <p:spTree>
+      <p:nvGrpSpPr>
+        <p:cNvPr id="1" name="Shape 74"/>
+        <p:cNvGrpSpPr/>
+        <p:nvPr/>
+      </p:nvGrpSpPr>
+      <p:grpSpPr>
+        <a:xfrm>
+          <a:off x="0" y="0"/>
+          <a:ext cx="0" cy="0"/>
+          <a:chOff x="0" y="0"/>
+          <a:chExt cx="0" cy="0"/>
+        </a:xfrm>
+      </p:grpSpPr>
+      <p:sp>
+        <p:nvSpPr>
+          <p:cNvPr id="75" name="Google Shape;75;gac10fef634_0_20:notes"/>
+          <p:cNvSpPr>
+            <a:spLocks noGrp="1" noRot="1" noChangeAspect="1"/>
+          </p:cNvSpPr>
+          <p:nvPr>
+            <p:ph type="sldImg" idx="2"/>
+          </p:nvPr>
+        </p:nvSpPr>
+        <p:spPr>
+          <a:xfrm>
+            <a:off x="381000" y="685800"/>
+            <a:ext cx="6096000" cy="3429000"/>
+          </a:xfrm>
+          <a:custGeom>
+            <a:avLst/>
+            <a:gdLst/>
+            <a:ahLst/>
+            <a:cxnLst/>
+            <a:rect l="l" t="t" r="r" b="b"/>
+            <a:pathLst>
+              <a:path w="120000" h="120000" extrusionOk="0">
+                <a:moveTo>
+                  <a:pt x="0" y="0"/>
+                </a:moveTo>
+                <a:lnTo>
+                  <a:pt x="120000" y="0"/>
+                </a:lnTo>
+                <a:lnTo>
+                  <a:pt x="120000" y="120000"/>
+                </a:lnTo>
+                <a:lnTo>
+                  <a:pt x="0" y="120000"/>
+                </a:lnTo>
+                <a:close/>
+              </a:path>
+            </a:pathLst>
+          </a:custGeom>
+        </p:spPr>
+      </p:sp>
+      <p:sp>
+        <p:nvSpPr>
+          <p:cNvPr id="76" name="Google Shape;76;gac10fef634_0_20:notes"/>
+          <p:cNvSpPr txBox="1">
+            <a:spLocks noGrp="1"/>
+          </p:cNvSpPr>
+          <p:nvPr>
+            <p:ph type="body" idx="1"/>
+          </p:nvPr>
+        </p:nvSpPr>
+        <p:spPr>
+          <a:xfrm>
+            <a:off x="685800" y="4343400"/>
+            <a:ext cx="5486400" cy="4114800"/>
+          </a:xfrm>
+          <a:prstGeom prst="rect">
+            <a:avLst/>
+          </a:prstGeom>
+        </p:spPr>
+        <p:txBody>
+          <a:bodyPr spcFirstLastPara="1" wrap="square" lIns="91425" tIns="91425" rIns="91425" bIns="91425" anchor="t" anchorCtr="0">
+            <a:noAutofit/>
+          </a:bodyPr>
+          <a:lstStyle/>
+          <a:p>
+            <a:pPr marL="0" lvl="0" indent="0" algn="l" rtl="0">
+              <a:spcBef>
+                <a:spcPts val="0"/>
+              </a:spcBef>
+              <a:spcAft>
+                <a:spcPts val="0"/>
+              </a:spcAft>
+              <a:buNone/>
+            </a:pPr>
+            <a:endParaRPr/>
+          </a:p>
+        </p:txBody>
+      </p:sp>
+    </p:spTree>
+    <p:extLst>
+      <p:ext uri="{BB962C8B-B14F-4D97-AF65-F5344CB8AC3E}">
+        <p14:creationId xmlns:p14="http://schemas.microsoft.com/office/powerpoint/2010/main" val="2870524391"/>
+      </p:ext>
+    </p:extLst>
+  </p:cSld>
+  <p:clrMapOvr>
+    <a:masterClrMapping/>
+  </p:clrMapOvr>
+</p:notes>
+</file>
+
+<file path=ppt/notesSlides/notesSlide28.xml><?xml version="1.0" encoding="utf-8"?>
+<p:notes xmlns:a="http://schemas.openxmlformats.org/drawingml/2006/main" xmlns:r="http://schemas.openxmlformats.org/officeDocument/2006/relationships" xmlns:p="http://schemas.openxmlformats.org/presentationml/2006/main" showMasterSp="0" showMasterPhAnim="0">
+  <p:cSld>
+    <p:spTree>
+      <p:nvGrpSpPr>
         <p:cNvPr id="1" name="Shape 80"/>
         <p:cNvGrpSpPr/>
         <p:nvPr/>
@@ -3583,7 +4163,7 @@
 </p:notes>
 </file>
 
-<file path=ppt/notesSlides/notesSlide25.xml><?xml version="1.0" encoding="utf-8"?>
+<file path=ppt/notesSlides/notesSlide29.xml><?xml version="1.0" encoding="utf-8"?>
 <p:notes xmlns:a="http://schemas.openxmlformats.org/drawingml/2006/main" xmlns:r="http://schemas.openxmlformats.org/officeDocument/2006/relationships" xmlns:p="http://schemas.openxmlformats.org/presentationml/2006/main" showMasterSp="0" showMasterPhAnim="0">
   <p:cSld>
     <p:spTree>
@@ -13288,6 +13868,1052 @@
 <file path=ppt/slides/slide24.xml><?xml version="1.0" encoding="utf-8"?>
 <p:sld xmlns:a="http://schemas.openxmlformats.org/drawingml/2006/main" xmlns:r="http://schemas.openxmlformats.org/officeDocument/2006/relationships" xmlns:p="http://schemas.openxmlformats.org/presentationml/2006/main">
   <p:cSld>
+    <p:spTree>
+      <p:nvGrpSpPr>
+        <p:cNvPr id="1" name="Shape 72"/>
+        <p:cNvGrpSpPr/>
+        <p:nvPr/>
+      </p:nvGrpSpPr>
+      <p:grpSpPr>
+        <a:xfrm>
+          <a:off x="0" y="0"/>
+          <a:ext cx="0" cy="0"/>
+          <a:chOff x="0" y="0"/>
+          <a:chExt cx="0" cy="0"/>
+        </a:xfrm>
+      </p:grpSpPr>
+      <p:sp>
+        <p:nvSpPr>
+          <p:cNvPr id="73" name="Google Shape;73;p16"/>
+          <p:cNvSpPr txBox="1">
+            <a:spLocks noGrp="1"/>
+          </p:cNvSpPr>
+          <p:nvPr>
+            <p:ph type="title"/>
+          </p:nvPr>
+        </p:nvSpPr>
+        <p:spPr>
+          <a:xfrm>
+            <a:off x="311700" y="445025"/>
+            <a:ext cx="8520600" cy="572700"/>
+          </a:xfrm>
+          <a:prstGeom prst="rect">
+            <a:avLst/>
+          </a:prstGeom>
+        </p:spPr>
+        <p:txBody>
+          <a:bodyPr spcFirstLastPara="1" wrap="square" lIns="91425" tIns="91425" rIns="91425" bIns="91425" anchor="t" anchorCtr="0">
+            <a:noAutofit/>
+          </a:bodyPr>
+          <a:lstStyle/>
+          <a:p>
+            <a:pPr marL="0" lvl="0" indent="0" algn="l" rtl="0">
+              <a:spcBef>
+                <a:spcPts val="0"/>
+              </a:spcBef>
+              <a:spcAft>
+                <a:spcPts val="0"/>
+              </a:spcAft>
+              <a:buNone/>
+            </a:pPr>
+            <a:r>
+              <a:rPr lang="en" dirty="0"/>
+              <a:t>Component 4 Delivery info version 2</a:t>
+            </a:r>
+            <a:endParaRPr dirty="0"/>
+          </a:p>
+        </p:txBody>
+      </p:sp>
+      <p:pic>
+        <p:nvPicPr>
+          <p:cNvPr id="3" name="Picture 2">
+            <a:extLst>
+              <a:ext uri="{FF2B5EF4-FFF2-40B4-BE49-F238E27FC236}">
+                <a16:creationId xmlns:a16="http://schemas.microsoft.com/office/drawing/2014/main" id="{68F19E0E-F021-4DF4-944A-26E005F119F0}"/>
+              </a:ext>
+            </a:extLst>
+          </p:cNvPr>
+          <p:cNvPicPr>
+            <a:picLocks noChangeAspect="1"/>
+          </p:cNvPicPr>
+          <p:nvPr/>
+        </p:nvPicPr>
+        <p:blipFill>
+          <a:blip r:embed="rId3"/>
+          <a:stretch>
+            <a:fillRect/>
+          </a:stretch>
+        </p:blipFill>
+        <p:spPr>
+          <a:xfrm>
+            <a:off x="693420" y="1131428"/>
+            <a:ext cx="7551420" cy="3496028"/>
+          </a:xfrm>
+          <a:prstGeom prst="rect">
+            <a:avLst/>
+          </a:prstGeom>
+        </p:spPr>
+      </p:pic>
+    </p:spTree>
+    <p:extLst>
+      <p:ext uri="{BB962C8B-B14F-4D97-AF65-F5344CB8AC3E}">
+        <p14:creationId xmlns:p14="http://schemas.microsoft.com/office/powerpoint/2010/main" val="872163139"/>
+      </p:ext>
+    </p:extLst>
+  </p:cSld>
+  <p:clrMapOvr>
+    <a:masterClrMapping/>
+  </p:clrMapOvr>
+</p:sld>
+</file>
+
+<file path=ppt/slides/slide25.xml><?xml version="1.0" encoding="utf-8"?>
+<p:sld xmlns:a="http://schemas.openxmlformats.org/drawingml/2006/main" xmlns:r="http://schemas.openxmlformats.org/officeDocument/2006/relationships" xmlns:p="http://schemas.openxmlformats.org/presentationml/2006/main">
+  <p:cSld>
+    <p:spTree>
+      <p:nvGrpSpPr>
+        <p:cNvPr id="1" name="Shape 77"/>
+        <p:cNvGrpSpPr/>
+        <p:nvPr/>
+      </p:nvGrpSpPr>
+      <p:grpSpPr>
+        <a:xfrm>
+          <a:off x="0" y="0"/>
+          <a:ext cx="0" cy="0"/>
+          <a:chOff x="0" y="0"/>
+          <a:chExt cx="0" cy="0"/>
+        </a:xfrm>
+      </p:grpSpPr>
+      <p:sp>
+        <p:nvSpPr>
+          <p:cNvPr id="78" name="Google Shape;78;p17"/>
+          <p:cNvSpPr txBox="1">
+            <a:spLocks noGrp="1"/>
+          </p:cNvSpPr>
+          <p:nvPr>
+            <p:ph type="title"/>
+          </p:nvPr>
+        </p:nvSpPr>
+        <p:spPr>
+          <a:xfrm>
+            <a:off x="311700" y="117365"/>
+            <a:ext cx="8520600" cy="572700"/>
+          </a:xfrm>
+          <a:prstGeom prst="rect">
+            <a:avLst/>
+          </a:prstGeom>
+        </p:spPr>
+        <p:txBody>
+          <a:bodyPr spcFirstLastPara="1" wrap="square" lIns="91425" tIns="91425" rIns="91425" bIns="91425" anchor="t" anchorCtr="0">
+            <a:noAutofit/>
+          </a:bodyPr>
+          <a:lstStyle/>
+          <a:p>
+            <a:pPr marL="0" lvl="0" indent="0" algn="l" rtl="0">
+              <a:spcBef>
+                <a:spcPts val="0"/>
+              </a:spcBef>
+              <a:spcAft>
+                <a:spcPts val="0"/>
+              </a:spcAft>
+              <a:buNone/>
+            </a:pPr>
+            <a:r>
+              <a:rPr lang="en" sz="2400" dirty="0"/>
+              <a:t>Component 4 v2 - Test Plan (and screenshot)</a:t>
+            </a:r>
+            <a:endParaRPr sz="2400" dirty="0"/>
+          </a:p>
+        </p:txBody>
+      </p:sp>
+      <p:graphicFrame>
+        <p:nvGraphicFramePr>
+          <p:cNvPr id="79" name="Google Shape;79;p17"/>
+          <p:cNvGraphicFramePr/>
+          <p:nvPr>
+            <p:extLst>
+              <p:ext uri="{D42A27DB-BD31-4B8C-83A1-F6EECF244321}">
+                <p14:modId xmlns:p14="http://schemas.microsoft.com/office/powerpoint/2010/main" val="1125550740"/>
+              </p:ext>
+            </p:extLst>
+          </p:nvPr>
+        </p:nvGraphicFramePr>
+        <p:xfrm>
+          <a:off x="426000" y="3255675"/>
+          <a:ext cx="8520600" cy="1828740"/>
+        </p:xfrm>
+        <a:graphic>
+          <a:graphicData uri="http://schemas.openxmlformats.org/drawingml/2006/table">
+            <a:tbl>
+              <a:tblPr>
+                <a:noFill/>
+                <a:tableStyleId>{E1099E06-0E6B-448D-9D27-60429F06E6F4}</a:tableStyleId>
+              </a:tblPr>
+              <a:tblGrid>
+                <a:gridCol w="4260300">
+                  <a:extLst>
+                    <a:ext uri="{9D8B030D-6E8A-4147-A177-3AD203B41FA5}">
+                      <a16:colId xmlns:a16="http://schemas.microsoft.com/office/drawing/2014/main" val="20000"/>
+                    </a:ext>
+                  </a:extLst>
+                </a:gridCol>
+                <a:gridCol w="4260300">
+                  <a:extLst>
+                    <a:ext uri="{9D8B030D-6E8A-4147-A177-3AD203B41FA5}">
+                      <a16:colId xmlns:a16="http://schemas.microsoft.com/office/drawing/2014/main" val="20001"/>
+                    </a:ext>
+                  </a:extLst>
+                </a:gridCol>
+              </a:tblGrid>
+              <a:tr h="381000">
+                <a:tc>
+                  <a:txBody>
+                    <a:bodyPr/>
+                    <a:lstStyle/>
+                    <a:p>
+                      <a:pPr marL="0" lvl="0" indent="0" algn="l" rtl="0">
+                        <a:spcBef>
+                          <a:spcPts val="0"/>
+                        </a:spcBef>
+                        <a:spcAft>
+                          <a:spcPts val="0"/>
+                        </a:spcAft>
+                        <a:buNone/>
+                      </a:pPr>
+                      <a:r>
+                        <a:rPr lang="en" sz="1800" b="1" dirty="0"/>
+                        <a:t>Test Case</a:t>
+                      </a:r>
+                      <a:endParaRPr sz="1800" b="1" dirty="0"/>
+                    </a:p>
+                  </a:txBody>
+                  <a:tcPr marL="91425" marR="91425" marT="91425" marB="91425">
+                    <a:solidFill>
+                      <a:srgbClr val="CCCCCC"/>
+                    </a:solidFill>
+                  </a:tcPr>
+                </a:tc>
+                <a:tc>
+                  <a:txBody>
+                    <a:bodyPr/>
+                    <a:lstStyle/>
+                    <a:p>
+                      <a:pPr marL="0" lvl="0" indent="0" algn="l" rtl="0">
+                        <a:spcBef>
+                          <a:spcPts val="0"/>
+                        </a:spcBef>
+                        <a:spcAft>
+                          <a:spcPts val="0"/>
+                        </a:spcAft>
+                        <a:buNone/>
+                      </a:pPr>
+                      <a:r>
+                        <a:rPr lang="en" sz="1800" b="1"/>
+                        <a:t>Expected Values</a:t>
+                      </a:r>
+                      <a:endParaRPr sz="1800" b="1"/>
+                    </a:p>
+                  </a:txBody>
+                  <a:tcPr marL="91425" marR="91425" marT="91425" marB="91425">
+                    <a:solidFill>
+                      <a:srgbClr val="CCCCCC"/>
+                    </a:solidFill>
+                  </a:tcPr>
+                </a:tc>
+                <a:extLst>
+                  <a:ext uri="{0D108BD9-81ED-4DB2-BD59-A6C34878D82A}">
+                    <a16:rowId xmlns:a16="http://schemas.microsoft.com/office/drawing/2014/main" val="10000"/>
+                  </a:ext>
+                </a:extLst>
+              </a:tr>
+              <a:tr h="396200">
+                <a:tc>
+                  <a:txBody>
+                    <a:bodyPr/>
+                    <a:lstStyle/>
+                    <a:p>
+                      <a:pPr marL="0" lvl="0" indent="0" algn="l" rtl="0">
+                        <a:spcBef>
+                          <a:spcPts val="0"/>
+                        </a:spcBef>
+                        <a:spcAft>
+                          <a:spcPts val="0"/>
+                        </a:spcAft>
+                        <a:buNone/>
+                      </a:pPr>
+                      <a:r>
+                        <a:rPr lang="en-NZ" sz="1300" dirty="0"/>
+                        <a:t>Input name</a:t>
+                      </a:r>
+                    </a:p>
+                    <a:p>
+                      <a:pPr marL="0" lvl="0" indent="0" algn="l" rtl="0">
+                        <a:spcBef>
+                          <a:spcPts val="0"/>
+                        </a:spcBef>
+                        <a:spcAft>
+                          <a:spcPts val="0"/>
+                        </a:spcAft>
+                        <a:buNone/>
+                      </a:pPr>
+                      <a:r>
+                        <a:rPr lang="en-NZ" sz="1300" dirty="0"/>
+                        <a:t>Input phone number</a:t>
+                      </a:r>
+                    </a:p>
+                    <a:p>
+                      <a:pPr marL="0" lvl="0" indent="0" algn="l" rtl="0">
+                        <a:spcBef>
+                          <a:spcPts val="0"/>
+                        </a:spcBef>
+                        <a:spcAft>
+                          <a:spcPts val="0"/>
+                        </a:spcAft>
+                        <a:buNone/>
+                      </a:pPr>
+                      <a:r>
+                        <a:rPr lang="en-NZ" sz="1300" dirty="0"/>
+                        <a:t>Input house number</a:t>
+                      </a:r>
+                    </a:p>
+                    <a:p>
+                      <a:pPr marL="0" lvl="0" indent="0" algn="l" rtl="0">
+                        <a:spcBef>
+                          <a:spcPts val="0"/>
+                        </a:spcBef>
+                        <a:spcAft>
+                          <a:spcPts val="0"/>
+                        </a:spcAft>
+                        <a:buNone/>
+                      </a:pPr>
+                      <a:r>
+                        <a:rPr lang="en-NZ" sz="1300" dirty="0"/>
+                        <a:t>Street name</a:t>
+                      </a:r>
+                    </a:p>
+                    <a:p>
+                      <a:pPr marL="0" lvl="0" indent="0" algn="l" rtl="0">
+                        <a:spcBef>
+                          <a:spcPts val="0"/>
+                        </a:spcBef>
+                        <a:spcAft>
+                          <a:spcPts val="0"/>
+                        </a:spcAft>
+                        <a:buNone/>
+                      </a:pPr>
+                      <a:r>
+                        <a:rPr lang="en-NZ" sz="1300" dirty="0"/>
+                        <a:t>Suburb name</a:t>
+                      </a:r>
+                    </a:p>
+                    <a:p>
+                      <a:pPr marL="0" lvl="0" indent="0" algn="l" rtl="0">
+                        <a:spcBef>
+                          <a:spcPts val="0"/>
+                        </a:spcBef>
+                        <a:spcAft>
+                          <a:spcPts val="0"/>
+                        </a:spcAft>
+                        <a:buNone/>
+                      </a:pPr>
+                      <a:r>
+                        <a:rPr lang="en-NZ" sz="1300" dirty="0"/>
+                        <a:t>Left input blank</a:t>
+                      </a:r>
+                      <a:endParaRPr sz="1300" dirty="0"/>
+                    </a:p>
+                  </a:txBody>
+                  <a:tcPr marL="91425" marR="91425" marT="91425" marB="91425"/>
+                </a:tc>
+                <a:tc>
+                  <a:txBody>
+                    <a:bodyPr/>
+                    <a:lstStyle/>
+                    <a:p>
+                      <a:pPr marL="0" lvl="0" indent="0" algn="l" rtl="0">
+                        <a:spcBef>
+                          <a:spcPts val="0"/>
+                        </a:spcBef>
+                        <a:spcAft>
+                          <a:spcPts val="0"/>
+                        </a:spcAft>
+                        <a:buNone/>
+                      </a:pPr>
+                      <a:r>
+                        <a:rPr lang="en-NZ" sz="1300" dirty="0"/>
+                        <a:t>Printed name correctly</a:t>
+                      </a:r>
+                    </a:p>
+                    <a:p>
+                      <a:pPr marL="0" lvl="0" indent="0" algn="l" rtl="0">
+                        <a:spcBef>
+                          <a:spcPts val="0"/>
+                        </a:spcBef>
+                        <a:spcAft>
+                          <a:spcPts val="0"/>
+                        </a:spcAft>
+                        <a:buNone/>
+                      </a:pPr>
+                      <a:r>
+                        <a:rPr lang="en-NZ" sz="1300" dirty="0"/>
+                        <a:t>Printed phone number correctly </a:t>
+                      </a:r>
+                    </a:p>
+                    <a:p>
+                      <a:pPr marL="0" lvl="0" indent="0" algn="l" rtl="0">
+                        <a:spcBef>
+                          <a:spcPts val="0"/>
+                        </a:spcBef>
+                        <a:spcAft>
+                          <a:spcPts val="0"/>
+                        </a:spcAft>
+                        <a:buNone/>
+                      </a:pPr>
+                      <a:r>
+                        <a:rPr lang="en-NZ" sz="1300" dirty="0"/>
+                        <a:t>Printed house number</a:t>
+                      </a:r>
+                    </a:p>
+                    <a:p>
+                      <a:pPr marL="0" lvl="0" indent="0" algn="l" rtl="0">
+                        <a:spcBef>
+                          <a:spcPts val="0"/>
+                        </a:spcBef>
+                        <a:spcAft>
+                          <a:spcPts val="0"/>
+                        </a:spcAft>
+                        <a:buNone/>
+                      </a:pPr>
+                      <a:r>
+                        <a:rPr lang="en-NZ" sz="1300" dirty="0"/>
+                        <a:t>Printed street name</a:t>
+                      </a:r>
+                    </a:p>
+                    <a:p>
+                      <a:pPr marL="0" lvl="0" indent="0" algn="l" rtl="0">
+                        <a:spcBef>
+                          <a:spcPts val="0"/>
+                        </a:spcBef>
+                        <a:spcAft>
+                          <a:spcPts val="0"/>
+                        </a:spcAft>
+                        <a:buNone/>
+                      </a:pPr>
+                      <a:r>
+                        <a:rPr lang="en-NZ" sz="1300" dirty="0"/>
+                        <a:t>Printed suburb name</a:t>
+                      </a:r>
+                    </a:p>
+                    <a:p>
+                      <a:pPr marL="0" lvl="0" indent="0" algn="l" rtl="0">
+                        <a:spcBef>
+                          <a:spcPts val="0"/>
+                        </a:spcBef>
+                        <a:spcAft>
+                          <a:spcPts val="0"/>
+                        </a:spcAft>
+                        <a:buNone/>
+                      </a:pPr>
+                      <a:r>
+                        <a:rPr lang="en-NZ" sz="1300" dirty="0"/>
+                        <a:t>Asked for input again	</a:t>
+                      </a:r>
+                      <a:endParaRPr sz="1300" dirty="0"/>
+                    </a:p>
+                  </a:txBody>
+                  <a:tcPr marL="91425" marR="91425" marT="91425" marB="91425"/>
+                </a:tc>
+                <a:extLst>
+                  <a:ext uri="{0D108BD9-81ED-4DB2-BD59-A6C34878D82A}">
+                    <a16:rowId xmlns:a16="http://schemas.microsoft.com/office/drawing/2014/main" val="10001"/>
+                  </a:ext>
+                </a:extLst>
+              </a:tr>
+            </a:tbl>
+          </a:graphicData>
+        </a:graphic>
+      </p:graphicFrame>
+      <p:pic>
+        <p:nvPicPr>
+          <p:cNvPr id="4" name="Picture 3">
+            <a:extLst>
+              <a:ext uri="{FF2B5EF4-FFF2-40B4-BE49-F238E27FC236}">
+                <a16:creationId xmlns:a16="http://schemas.microsoft.com/office/drawing/2014/main" id="{A63FC167-7201-4185-AD0D-A1A5C0118B50}"/>
+              </a:ext>
+            </a:extLst>
+          </p:cNvPr>
+          <p:cNvPicPr>
+            <a:picLocks noChangeAspect="1"/>
+          </p:cNvPicPr>
+          <p:nvPr/>
+        </p:nvPicPr>
+        <p:blipFill>
+          <a:blip r:embed="rId3"/>
+          <a:stretch>
+            <a:fillRect/>
+          </a:stretch>
+        </p:blipFill>
+        <p:spPr>
+          <a:xfrm>
+            <a:off x="847819" y="605020"/>
+            <a:ext cx="2874939" cy="2565610"/>
+          </a:xfrm>
+          <a:prstGeom prst="rect">
+            <a:avLst/>
+          </a:prstGeom>
+        </p:spPr>
+      </p:pic>
+      <p:pic>
+        <p:nvPicPr>
+          <p:cNvPr id="7" name="Picture 6">
+            <a:extLst>
+              <a:ext uri="{FF2B5EF4-FFF2-40B4-BE49-F238E27FC236}">
+                <a16:creationId xmlns:a16="http://schemas.microsoft.com/office/drawing/2014/main" id="{E6EE6A81-9169-451B-B19E-1EEC663162DB}"/>
+              </a:ext>
+            </a:extLst>
+          </p:cNvPr>
+          <p:cNvPicPr>
+            <a:picLocks noChangeAspect="1"/>
+          </p:cNvPicPr>
+          <p:nvPr/>
+        </p:nvPicPr>
+        <p:blipFill>
+          <a:blip r:embed="rId4"/>
+          <a:stretch>
+            <a:fillRect/>
+          </a:stretch>
+        </p:blipFill>
+        <p:spPr>
+          <a:xfrm>
+            <a:off x="4767979" y="690065"/>
+            <a:ext cx="3372321" cy="2333951"/>
+          </a:xfrm>
+          <a:prstGeom prst="rect">
+            <a:avLst/>
+          </a:prstGeom>
+        </p:spPr>
+      </p:pic>
+    </p:spTree>
+    <p:extLst>
+      <p:ext uri="{BB962C8B-B14F-4D97-AF65-F5344CB8AC3E}">
+        <p14:creationId xmlns:p14="http://schemas.microsoft.com/office/powerpoint/2010/main" val="425023443"/>
+      </p:ext>
+    </p:extLst>
+  </p:cSld>
+  <p:clrMapOvr>
+    <a:masterClrMapping/>
+  </p:clrMapOvr>
+</p:sld>
+</file>
+
+<file path=ppt/slides/slide26.xml><?xml version="1.0" encoding="utf-8"?>
+<p:sld xmlns:a="http://schemas.openxmlformats.org/drawingml/2006/main" xmlns:r="http://schemas.openxmlformats.org/officeDocument/2006/relationships" xmlns:p="http://schemas.openxmlformats.org/presentationml/2006/main">
+  <p:cSld>
+    <p:spTree>
+      <p:nvGrpSpPr>
+        <p:cNvPr id="1" name="Shape 72"/>
+        <p:cNvGrpSpPr/>
+        <p:nvPr/>
+      </p:nvGrpSpPr>
+      <p:grpSpPr>
+        <a:xfrm>
+          <a:off x="0" y="0"/>
+          <a:ext cx="0" cy="0"/>
+          <a:chOff x="0" y="0"/>
+          <a:chExt cx="0" cy="0"/>
+        </a:xfrm>
+      </p:grpSpPr>
+      <p:sp>
+        <p:nvSpPr>
+          <p:cNvPr id="73" name="Google Shape;73;p16"/>
+          <p:cNvSpPr txBox="1">
+            <a:spLocks noGrp="1"/>
+          </p:cNvSpPr>
+          <p:nvPr>
+            <p:ph type="title"/>
+          </p:nvPr>
+        </p:nvSpPr>
+        <p:spPr>
+          <a:xfrm>
+            <a:off x="311700" y="445025"/>
+            <a:ext cx="8520600" cy="572700"/>
+          </a:xfrm>
+          <a:prstGeom prst="rect">
+            <a:avLst/>
+          </a:prstGeom>
+        </p:spPr>
+        <p:txBody>
+          <a:bodyPr spcFirstLastPara="1" wrap="square" lIns="91425" tIns="91425" rIns="91425" bIns="91425" anchor="t" anchorCtr="0">
+            <a:noAutofit/>
+          </a:bodyPr>
+          <a:lstStyle/>
+          <a:p>
+            <a:pPr marL="0" lvl="0" indent="0" algn="l" rtl="0">
+              <a:spcBef>
+                <a:spcPts val="0"/>
+              </a:spcBef>
+              <a:spcAft>
+                <a:spcPts val="0"/>
+              </a:spcAft>
+              <a:buNone/>
+            </a:pPr>
+            <a:r>
+              <a:rPr lang="en" dirty="0"/>
+              <a:t>Component 4 Delivery info version 2</a:t>
+            </a:r>
+            <a:endParaRPr dirty="0"/>
+          </a:p>
+        </p:txBody>
+      </p:sp>
+    </p:spTree>
+    <p:extLst>
+      <p:ext uri="{BB962C8B-B14F-4D97-AF65-F5344CB8AC3E}">
+        <p14:creationId xmlns:p14="http://schemas.microsoft.com/office/powerpoint/2010/main" val="597073633"/>
+      </p:ext>
+    </p:extLst>
+  </p:cSld>
+  <p:clrMapOvr>
+    <a:masterClrMapping/>
+  </p:clrMapOvr>
+</p:sld>
+</file>
+
+<file path=ppt/slides/slide27.xml><?xml version="1.0" encoding="utf-8"?>
+<p:sld xmlns:a="http://schemas.openxmlformats.org/drawingml/2006/main" xmlns:r="http://schemas.openxmlformats.org/officeDocument/2006/relationships" xmlns:p="http://schemas.openxmlformats.org/presentationml/2006/main">
+  <p:cSld>
+    <p:spTree>
+      <p:nvGrpSpPr>
+        <p:cNvPr id="1" name="Shape 77"/>
+        <p:cNvGrpSpPr/>
+        <p:nvPr/>
+      </p:nvGrpSpPr>
+      <p:grpSpPr>
+        <a:xfrm>
+          <a:off x="0" y="0"/>
+          <a:ext cx="0" cy="0"/>
+          <a:chOff x="0" y="0"/>
+          <a:chExt cx="0" cy="0"/>
+        </a:xfrm>
+      </p:grpSpPr>
+      <p:sp>
+        <p:nvSpPr>
+          <p:cNvPr id="78" name="Google Shape;78;p17"/>
+          <p:cNvSpPr txBox="1">
+            <a:spLocks noGrp="1"/>
+          </p:cNvSpPr>
+          <p:nvPr>
+            <p:ph type="title"/>
+          </p:nvPr>
+        </p:nvSpPr>
+        <p:spPr>
+          <a:xfrm>
+            <a:off x="311700" y="117365"/>
+            <a:ext cx="8520600" cy="572700"/>
+          </a:xfrm>
+          <a:prstGeom prst="rect">
+            <a:avLst/>
+          </a:prstGeom>
+        </p:spPr>
+        <p:txBody>
+          <a:bodyPr spcFirstLastPara="1" wrap="square" lIns="91425" tIns="91425" rIns="91425" bIns="91425" anchor="t" anchorCtr="0">
+            <a:noAutofit/>
+          </a:bodyPr>
+          <a:lstStyle/>
+          <a:p>
+            <a:pPr marL="0" lvl="0" indent="0" algn="l" rtl="0">
+              <a:spcBef>
+                <a:spcPts val="0"/>
+              </a:spcBef>
+              <a:spcAft>
+                <a:spcPts val="0"/>
+              </a:spcAft>
+              <a:buNone/>
+            </a:pPr>
+            <a:r>
+              <a:rPr lang="en" sz="2400" dirty="0"/>
+              <a:t>Component 4 v2 - Test Plan (and screenshot)</a:t>
+            </a:r>
+            <a:endParaRPr sz="2400" dirty="0"/>
+          </a:p>
+        </p:txBody>
+      </p:sp>
+      <p:graphicFrame>
+        <p:nvGraphicFramePr>
+          <p:cNvPr id="79" name="Google Shape;79;p17"/>
+          <p:cNvGraphicFramePr/>
+          <p:nvPr/>
+        </p:nvGraphicFramePr>
+        <p:xfrm>
+          <a:off x="426000" y="3255675"/>
+          <a:ext cx="8520600" cy="1828740"/>
+        </p:xfrm>
+        <a:graphic>
+          <a:graphicData uri="http://schemas.openxmlformats.org/drawingml/2006/table">
+            <a:tbl>
+              <a:tblPr>
+                <a:noFill/>
+                <a:tableStyleId>{E1099E06-0E6B-448D-9D27-60429F06E6F4}</a:tableStyleId>
+              </a:tblPr>
+              <a:tblGrid>
+                <a:gridCol w="4260300">
+                  <a:extLst>
+                    <a:ext uri="{9D8B030D-6E8A-4147-A177-3AD203B41FA5}">
+                      <a16:colId xmlns:a16="http://schemas.microsoft.com/office/drawing/2014/main" val="20000"/>
+                    </a:ext>
+                  </a:extLst>
+                </a:gridCol>
+                <a:gridCol w="4260300">
+                  <a:extLst>
+                    <a:ext uri="{9D8B030D-6E8A-4147-A177-3AD203B41FA5}">
+                      <a16:colId xmlns:a16="http://schemas.microsoft.com/office/drawing/2014/main" val="20001"/>
+                    </a:ext>
+                  </a:extLst>
+                </a:gridCol>
+              </a:tblGrid>
+              <a:tr h="381000">
+                <a:tc>
+                  <a:txBody>
+                    <a:bodyPr/>
+                    <a:lstStyle/>
+                    <a:p>
+                      <a:pPr marL="0" lvl="0" indent="0" algn="l" rtl="0">
+                        <a:spcBef>
+                          <a:spcPts val="0"/>
+                        </a:spcBef>
+                        <a:spcAft>
+                          <a:spcPts val="0"/>
+                        </a:spcAft>
+                        <a:buNone/>
+                      </a:pPr>
+                      <a:r>
+                        <a:rPr lang="en" sz="1800" b="1" dirty="0"/>
+                        <a:t>Test Case</a:t>
+                      </a:r>
+                      <a:endParaRPr sz="1800" b="1" dirty="0"/>
+                    </a:p>
+                  </a:txBody>
+                  <a:tcPr marL="91425" marR="91425" marT="91425" marB="91425">
+                    <a:solidFill>
+                      <a:srgbClr val="CCCCCC"/>
+                    </a:solidFill>
+                  </a:tcPr>
+                </a:tc>
+                <a:tc>
+                  <a:txBody>
+                    <a:bodyPr/>
+                    <a:lstStyle/>
+                    <a:p>
+                      <a:pPr marL="0" lvl="0" indent="0" algn="l" rtl="0">
+                        <a:spcBef>
+                          <a:spcPts val="0"/>
+                        </a:spcBef>
+                        <a:spcAft>
+                          <a:spcPts val="0"/>
+                        </a:spcAft>
+                        <a:buNone/>
+                      </a:pPr>
+                      <a:r>
+                        <a:rPr lang="en" sz="1800" b="1"/>
+                        <a:t>Expected Values</a:t>
+                      </a:r>
+                      <a:endParaRPr sz="1800" b="1"/>
+                    </a:p>
+                  </a:txBody>
+                  <a:tcPr marL="91425" marR="91425" marT="91425" marB="91425">
+                    <a:solidFill>
+                      <a:srgbClr val="CCCCCC"/>
+                    </a:solidFill>
+                  </a:tcPr>
+                </a:tc>
+                <a:extLst>
+                  <a:ext uri="{0D108BD9-81ED-4DB2-BD59-A6C34878D82A}">
+                    <a16:rowId xmlns:a16="http://schemas.microsoft.com/office/drawing/2014/main" val="10000"/>
+                  </a:ext>
+                </a:extLst>
+              </a:tr>
+              <a:tr h="396200">
+                <a:tc>
+                  <a:txBody>
+                    <a:bodyPr/>
+                    <a:lstStyle/>
+                    <a:p>
+                      <a:pPr marL="0" lvl="0" indent="0" algn="l" rtl="0">
+                        <a:spcBef>
+                          <a:spcPts val="0"/>
+                        </a:spcBef>
+                        <a:spcAft>
+                          <a:spcPts val="0"/>
+                        </a:spcAft>
+                        <a:buNone/>
+                      </a:pPr>
+                      <a:r>
+                        <a:rPr lang="en-NZ" sz="1300" dirty="0"/>
+                        <a:t>Input name</a:t>
+                      </a:r>
+                    </a:p>
+                    <a:p>
+                      <a:pPr marL="0" lvl="0" indent="0" algn="l" rtl="0">
+                        <a:spcBef>
+                          <a:spcPts val="0"/>
+                        </a:spcBef>
+                        <a:spcAft>
+                          <a:spcPts val="0"/>
+                        </a:spcAft>
+                        <a:buNone/>
+                      </a:pPr>
+                      <a:r>
+                        <a:rPr lang="en-NZ" sz="1300" dirty="0"/>
+                        <a:t>Input phone number</a:t>
+                      </a:r>
+                    </a:p>
+                    <a:p>
+                      <a:pPr marL="0" lvl="0" indent="0" algn="l" rtl="0">
+                        <a:spcBef>
+                          <a:spcPts val="0"/>
+                        </a:spcBef>
+                        <a:spcAft>
+                          <a:spcPts val="0"/>
+                        </a:spcAft>
+                        <a:buNone/>
+                      </a:pPr>
+                      <a:r>
+                        <a:rPr lang="en-NZ" sz="1300" dirty="0"/>
+                        <a:t>Input house number</a:t>
+                      </a:r>
+                    </a:p>
+                    <a:p>
+                      <a:pPr marL="0" lvl="0" indent="0" algn="l" rtl="0">
+                        <a:spcBef>
+                          <a:spcPts val="0"/>
+                        </a:spcBef>
+                        <a:spcAft>
+                          <a:spcPts val="0"/>
+                        </a:spcAft>
+                        <a:buNone/>
+                      </a:pPr>
+                      <a:r>
+                        <a:rPr lang="en-NZ" sz="1300" dirty="0"/>
+                        <a:t>Street name</a:t>
+                      </a:r>
+                    </a:p>
+                    <a:p>
+                      <a:pPr marL="0" lvl="0" indent="0" algn="l" rtl="0">
+                        <a:spcBef>
+                          <a:spcPts val="0"/>
+                        </a:spcBef>
+                        <a:spcAft>
+                          <a:spcPts val="0"/>
+                        </a:spcAft>
+                        <a:buNone/>
+                      </a:pPr>
+                      <a:r>
+                        <a:rPr lang="en-NZ" sz="1300" dirty="0"/>
+                        <a:t>Suburb name</a:t>
+                      </a:r>
+                    </a:p>
+                    <a:p>
+                      <a:pPr marL="0" lvl="0" indent="0" algn="l" rtl="0">
+                        <a:spcBef>
+                          <a:spcPts val="0"/>
+                        </a:spcBef>
+                        <a:spcAft>
+                          <a:spcPts val="0"/>
+                        </a:spcAft>
+                        <a:buNone/>
+                      </a:pPr>
+                      <a:r>
+                        <a:rPr lang="en-NZ" sz="1300" dirty="0"/>
+                        <a:t>Left input blank</a:t>
+                      </a:r>
+                      <a:endParaRPr sz="1300" dirty="0"/>
+                    </a:p>
+                  </a:txBody>
+                  <a:tcPr marL="91425" marR="91425" marT="91425" marB="91425"/>
+                </a:tc>
+                <a:tc>
+                  <a:txBody>
+                    <a:bodyPr/>
+                    <a:lstStyle/>
+                    <a:p>
+                      <a:pPr marL="0" lvl="0" indent="0" algn="l" rtl="0">
+                        <a:spcBef>
+                          <a:spcPts val="0"/>
+                        </a:spcBef>
+                        <a:spcAft>
+                          <a:spcPts val="0"/>
+                        </a:spcAft>
+                        <a:buNone/>
+                      </a:pPr>
+                      <a:r>
+                        <a:rPr lang="en-NZ" sz="1300" dirty="0"/>
+                        <a:t>Printed name correctly</a:t>
+                      </a:r>
+                    </a:p>
+                    <a:p>
+                      <a:pPr marL="0" lvl="0" indent="0" algn="l" rtl="0">
+                        <a:spcBef>
+                          <a:spcPts val="0"/>
+                        </a:spcBef>
+                        <a:spcAft>
+                          <a:spcPts val="0"/>
+                        </a:spcAft>
+                        <a:buNone/>
+                      </a:pPr>
+                      <a:r>
+                        <a:rPr lang="en-NZ" sz="1300" dirty="0"/>
+                        <a:t>Printed phone number correctly </a:t>
+                      </a:r>
+                    </a:p>
+                    <a:p>
+                      <a:pPr marL="0" lvl="0" indent="0" algn="l" rtl="0">
+                        <a:spcBef>
+                          <a:spcPts val="0"/>
+                        </a:spcBef>
+                        <a:spcAft>
+                          <a:spcPts val="0"/>
+                        </a:spcAft>
+                        <a:buNone/>
+                      </a:pPr>
+                      <a:r>
+                        <a:rPr lang="en-NZ" sz="1300" dirty="0"/>
+                        <a:t>Printed house number</a:t>
+                      </a:r>
+                    </a:p>
+                    <a:p>
+                      <a:pPr marL="0" lvl="0" indent="0" algn="l" rtl="0">
+                        <a:spcBef>
+                          <a:spcPts val="0"/>
+                        </a:spcBef>
+                        <a:spcAft>
+                          <a:spcPts val="0"/>
+                        </a:spcAft>
+                        <a:buNone/>
+                      </a:pPr>
+                      <a:r>
+                        <a:rPr lang="en-NZ" sz="1300" dirty="0"/>
+                        <a:t>Printed street name</a:t>
+                      </a:r>
+                    </a:p>
+                    <a:p>
+                      <a:pPr marL="0" lvl="0" indent="0" algn="l" rtl="0">
+                        <a:spcBef>
+                          <a:spcPts val="0"/>
+                        </a:spcBef>
+                        <a:spcAft>
+                          <a:spcPts val="0"/>
+                        </a:spcAft>
+                        <a:buNone/>
+                      </a:pPr>
+                      <a:r>
+                        <a:rPr lang="en-NZ" sz="1300" dirty="0"/>
+                        <a:t>Printed suburb name</a:t>
+                      </a:r>
+                    </a:p>
+                    <a:p>
+                      <a:pPr marL="0" lvl="0" indent="0" algn="l" rtl="0">
+                        <a:spcBef>
+                          <a:spcPts val="0"/>
+                        </a:spcBef>
+                        <a:spcAft>
+                          <a:spcPts val="0"/>
+                        </a:spcAft>
+                        <a:buNone/>
+                      </a:pPr>
+                      <a:r>
+                        <a:rPr lang="en-NZ" sz="1300" dirty="0"/>
+                        <a:t>Asked for input again	</a:t>
+                      </a:r>
+                      <a:endParaRPr sz="1300" dirty="0"/>
+                    </a:p>
+                  </a:txBody>
+                  <a:tcPr marL="91425" marR="91425" marT="91425" marB="91425"/>
+                </a:tc>
+                <a:extLst>
+                  <a:ext uri="{0D108BD9-81ED-4DB2-BD59-A6C34878D82A}">
+                    <a16:rowId xmlns:a16="http://schemas.microsoft.com/office/drawing/2014/main" val="10001"/>
+                  </a:ext>
+                </a:extLst>
+              </a:tr>
+            </a:tbl>
+          </a:graphicData>
+        </a:graphic>
+      </p:graphicFrame>
+      <p:pic>
+        <p:nvPicPr>
+          <p:cNvPr id="3" name="Picture 2">
+            <a:extLst>
+              <a:ext uri="{FF2B5EF4-FFF2-40B4-BE49-F238E27FC236}">
+                <a16:creationId xmlns:a16="http://schemas.microsoft.com/office/drawing/2014/main" id="{D088232B-DFBC-435E-858F-CB6FBD7CAD6F}"/>
+              </a:ext>
+            </a:extLst>
+          </p:cNvPr>
+          <p:cNvPicPr>
+            <a:picLocks noChangeAspect="1"/>
+          </p:cNvPicPr>
+          <p:nvPr/>
+        </p:nvPicPr>
+        <p:blipFill>
+          <a:blip r:embed="rId3"/>
+          <a:stretch>
+            <a:fillRect/>
+          </a:stretch>
+        </p:blipFill>
+        <p:spPr>
+          <a:xfrm>
+            <a:off x="4258877" y="767430"/>
+            <a:ext cx="4407783" cy="2240790"/>
+          </a:xfrm>
+          <a:prstGeom prst="rect">
+            <a:avLst/>
+          </a:prstGeom>
+        </p:spPr>
+      </p:pic>
+      <p:pic>
+        <p:nvPicPr>
+          <p:cNvPr id="6" name="Picture 5">
+            <a:extLst>
+              <a:ext uri="{FF2B5EF4-FFF2-40B4-BE49-F238E27FC236}">
+                <a16:creationId xmlns:a16="http://schemas.microsoft.com/office/drawing/2014/main" id="{38648B43-C8D9-46A0-8904-CD24F850A19C}"/>
+              </a:ext>
+            </a:extLst>
+          </p:cNvPr>
+          <p:cNvPicPr>
+            <a:picLocks noChangeAspect="1"/>
+          </p:cNvPicPr>
+          <p:nvPr/>
+        </p:nvPicPr>
+        <p:blipFill>
+          <a:blip r:embed="rId4"/>
+          <a:stretch>
+            <a:fillRect/>
+          </a:stretch>
+        </p:blipFill>
+        <p:spPr>
+          <a:xfrm>
+            <a:off x="825242" y="612761"/>
+            <a:ext cx="2787902" cy="2550127"/>
+          </a:xfrm>
+          <a:prstGeom prst="rect">
+            <a:avLst/>
+          </a:prstGeom>
+        </p:spPr>
+      </p:pic>
+    </p:spTree>
+    <p:extLst>
+      <p:ext uri="{BB962C8B-B14F-4D97-AF65-F5344CB8AC3E}">
+        <p14:creationId xmlns:p14="http://schemas.microsoft.com/office/powerpoint/2010/main" val="1149234813"/>
+      </p:ext>
+    </p:extLst>
+  </p:cSld>
+  <p:clrMapOvr>
+    <a:masterClrMapping/>
+  </p:clrMapOvr>
+</p:sld>
+</file>
+
+<file path=ppt/slides/slide28.xml><?xml version="1.0" encoding="utf-8"?>
+<p:sld xmlns:a="http://schemas.openxmlformats.org/drawingml/2006/main" xmlns:r="http://schemas.openxmlformats.org/officeDocument/2006/relationships" xmlns:p="http://schemas.openxmlformats.org/presentationml/2006/main">
+  <p:cSld>
     <p:bg>
       <p:bgPr>
         <a:solidFill>
@@ -13402,7 +15028,7 @@
 </p:sld>
 </file>
 
-<file path=ppt/slides/slide25.xml><?xml version="1.0" encoding="utf-8"?>
+<file path=ppt/slides/slide29.xml><?xml version="1.0" encoding="utf-8"?>
 <p:sld xmlns:a="http://schemas.openxmlformats.org/drawingml/2006/main" xmlns:r="http://schemas.openxmlformats.org/officeDocument/2006/relationships" xmlns:p="http://schemas.openxmlformats.org/presentationml/2006/main">
   <p:cSld>
     <p:bg>

</xml_diff>